<commit_message>
Enhanced visibility of certain elements. Fixed typos.
</commit_message>
<xml_diff>
--- a/Git-robolab-lab.pptx
+++ b/Git-robolab-lab.pptx
@@ -3986,6 +3986,15 @@
           <a:lstStyle/>
           <a:p>
             <a:r>
+              <a:rPr lang="en-US" dirty="0" smtClean="0">
+                <a:solidFill>
+                  <a:schemeClr val="bg1"/>
+                </a:solidFill>
+                <a:latin typeface="Bahnschrift Light" panose="020B0502040204020203" pitchFamily="34" charset="0"/>
+              </a:rPr>
+              <a:t>by </a:t>
+            </a:r>
+            <a:r>
               <a:rPr lang="en-US" dirty="0" err="1" smtClean="0">
                 <a:solidFill>
                   <a:schemeClr val="bg1"/>
@@ -4090,7 +4099,7 @@
         </p:blipFill>
         <p:spPr bwMode="auto">
           <a:xfrm>
-            <a:off x="1208669" y="1581150"/>
+            <a:off x="1524000" y="1617163"/>
             <a:ext cx="5922539" cy="3621587"/>
           </a:xfrm>
           <a:prstGeom prst="rect">
@@ -5253,10 +5262,7 @@
             <a:r>
               <a:rPr lang="en-US" dirty="0" smtClean="0">
                 <a:solidFill>
-                  <a:schemeClr val="tx1">
-                    <a:lumMod val="65000"/>
-                    <a:lumOff val="35000"/>
-                  </a:schemeClr>
+                  <a:srgbClr val="FFFF00"/>
                 </a:solidFill>
                 <a:latin typeface="Bahnschrift Light" panose="020B0502040204020203" pitchFamily="34" charset="0"/>
               </a:rPr>
@@ -5290,10 +5296,7 @@
             <a:r>
               <a:rPr lang="en-US" dirty="0" smtClean="0">
                 <a:solidFill>
-                  <a:schemeClr val="tx1">
-                    <a:lumMod val="65000"/>
-                    <a:lumOff val="35000"/>
-                  </a:schemeClr>
+                  <a:srgbClr val="FFFF00"/>
                 </a:solidFill>
                 <a:latin typeface="Bahnschrift Light" panose="020B0502040204020203" pitchFamily="34" charset="0"/>
               </a:rPr>
@@ -5302,10 +5305,7 @@
             <a:r>
               <a:rPr lang="en-US" dirty="0" err="1" smtClean="0">
                 <a:solidFill>
-                  <a:schemeClr val="tx1">
-                    <a:lumMod val="65000"/>
-                    <a:lumOff val="35000"/>
-                  </a:schemeClr>
+                  <a:srgbClr val="FFFF00"/>
                 </a:solidFill>
                 <a:latin typeface="Bahnschrift Light" panose="020B0502040204020203" pitchFamily="34" charset="0"/>
               </a:rPr>
@@ -5313,10 +5313,7 @@
             </a:r>
             <a:endParaRPr lang="en-US" dirty="0" smtClean="0">
               <a:solidFill>
-                <a:schemeClr val="tx1">
-                  <a:lumMod val="65000"/>
-                  <a:lumOff val="35000"/>
-                </a:schemeClr>
+                <a:srgbClr val="FFFF00"/>
               </a:solidFill>
               <a:latin typeface="Bahnschrift Light" panose="020B0502040204020203" pitchFamily="34" charset="0"/>
             </a:endParaRPr>
@@ -5339,10 +5336,7 @@
           </a:prstGeom>
           <a:ln w="38100">
             <a:solidFill>
-              <a:schemeClr val="tx1">
-                <a:lumMod val="85000"/>
-                <a:lumOff val="15000"/>
-              </a:schemeClr>
+              <a:srgbClr val="FFFF00"/>
             </a:solidFill>
             <a:prstDash val="solid"/>
             <a:tailEnd type="none" w="lg" len="med"/>
@@ -5429,10 +5423,7 @@
           </a:prstGeom>
           <a:ln w="38100">
             <a:solidFill>
-              <a:schemeClr val="tx1">
-                <a:lumMod val="85000"/>
-                <a:lumOff val="15000"/>
-              </a:schemeClr>
+              <a:srgbClr val="FFFF00"/>
             </a:solidFill>
             <a:prstDash val="solid"/>
             <a:tailEnd type="none" w="lg" len="med"/>
@@ -5473,10 +5464,7 @@
           </a:prstGeom>
           <a:ln w="38100">
             <a:solidFill>
-              <a:schemeClr val="tx1">
-                <a:lumMod val="85000"/>
-                <a:lumOff val="15000"/>
-              </a:schemeClr>
+              <a:srgbClr val="FFFF00"/>
             </a:solidFill>
             <a:prstDash val="solid"/>
             <a:tailEnd type="none" w="lg" len="med"/>
@@ -5542,8 +5530,8 @@
         </p:nvCxnSpPr>
         <p:spPr>
           <a:xfrm>
-            <a:off x="628107" y="2266950"/>
-            <a:ext cx="0" cy="914400"/>
+            <a:off x="615600" y="2266950"/>
+            <a:ext cx="0" cy="838200"/>
           </a:xfrm>
           <a:prstGeom prst="line">
             <a:avLst/>
@@ -6673,10 +6661,7 @@
             <a:r>
               <a:rPr lang="en-US" dirty="0" smtClean="0">
                 <a:solidFill>
-                  <a:schemeClr val="tx1">
-                    <a:lumMod val="65000"/>
-                    <a:lumOff val="35000"/>
-                  </a:schemeClr>
+                  <a:srgbClr val="FFFF00"/>
                 </a:solidFill>
                 <a:latin typeface="Bahnschrift Light" panose="020B0502040204020203" pitchFamily="34" charset="0"/>
               </a:rPr>
@@ -6684,10 +6669,7 @@
             </a:r>
             <a:endParaRPr lang="de-DE" dirty="0" smtClean="0">
               <a:solidFill>
-                <a:schemeClr val="tx1">
-                  <a:lumMod val="65000"/>
-                  <a:lumOff val="35000"/>
-                </a:schemeClr>
+                <a:srgbClr val="FFFF00"/>
               </a:solidFill>
               <a:latin typeface="Bahnschrift Light" panose="020B0502040204020203" pitchFamily="34" charset="0"/>
             </a:endParaRPr>
@@ -6719,10 +6701,7 @@
             <a:r>
               <a:rPr lang="en-US" dirty="0" smtClean="0">
                 <a:solidFill>
-                  <a:schemeClr val="tx1">
-                    <a:lumMod val="65000"/>
-                    <a:lumOff val="35000"/>
-                  </a:schemeClr>
+                  <a:srgbClr val="FFFF00"/>
                 </a:solidFill>
                 <a:latin typeface="Bahnschrift Light" panose="020B0502040204020203" pitchFamily="34" charset="0"/>
               </a:rPr>
@@ -6830,10 +6809,7 @@
           </a:prstGeom>
           <a:ln w="38100">
             <a:solidFill>
-              <a:schemeClr val="tx1">
-                <a:lumMod val="85000"/>
-                <a:lumOff val="15000"/>
-              </a:schemeClr>
+              <a:srgbClr val="FFFF00"/>
             </a:solidFill>
             <a:prstDash val="solid"/>
             <a:tailEnd type="none" w="lg" len="med"/>
@@ -6874,10 +6850,7 @@
           </a:prstGeom>
           <a:ln w="38100">
             <a:solidFill>
-              <a:schemeClr val="tx1">
-                <a:lumMod val="85000"/>
-                <a:lumOff val="15000"/>
-              </a:schemeClr>
+              <a:srgbClr val="FFFF00"/>
             </a:solidFill>
             <a:prstDash val="solid"/>
             <a:tailEnd type="none" w="lg" len="med"/>
@@ -7785,9 +7758,7 @@
       <p:cxnSp>
         <p:nvCxnSpPr>
           <p:cNvPr id="8" name="Gekrümmte Verbindung 7"/>
-          <p:cNvCxnSpPr>
-            <a:endCxn id="7" idx="1"/>
-          </p:cNvCxnSpPr>
+          <p:cNvCxnSpPr/>
           <p:nvPr/>
         </p:nvCxnSpPr>
         <p:spPr>
@@ -7802,10 +7773,7 @@
           </a:prstGeom>
           <a:ln w="38100" cmpd="sng">
             <a:solidFill>
-              <a:schemeClr val="tx1">
-                <a:lumMod val="85000"/>
-                <a:lumOff val="15000"/>
-              </a:schemeClr>
+              <a:srgbClr val="FFFF00"/>
             </a:solidFill>
             <a:prstDash val="solid"/>
             <a:round/>
@@ -7864,9 +7832,7 @@
       <p:cxnSp>
         <p:nvCxnSpPr>
           <p:cNvPr id="16" name="Gekrümmte Verbindung 15"/>
-          <p:cNvCxnSpPr>
-            <a:endCxn id="15" idx="1"/>
-          </p:cNvCxnSpPr>
+          <p:cNvCxnSpPr/>
           <p:nvPr/>
         </p:nvCxnSpPr>
         <p:spPr>
@@ -7881,10 +7847,7 @@
           </a:prstGeom>
           <a:ln w="38100">
             <a:solidFill>
-              <a:schemeClr val="tx1">
-                <a:lumMod val="85000"/>
-                <a:lumOff val="15000"/>
-              </a:schemeClr>
+              <a:srgbClr val="FFFF00"/>
             </a:solidFill>
             <a:prstDash val="solid"/>
             <a:tailEnd type="none" w="lg" len="med"/>
@@ -7942,9 +7905,7 @@
       <p:cxnSp>
         <p:nvCxnSpPr>
           <p:cNvPr id="21" name="Gekrümmte Verbindung 20"/>
-          <p:cNvCxnSpPr>
-            <a:endCxn id="20" idx="1"/>
-          </p:cNvCxnSpPr>
+          <p:cNvCxnSpPr/>
           <p:nvPr/>
         </p:nvCxnSpPr>
         <p:spPr>
@@ -7959,10 +7920,7 @@
           </a:prstGeom>
           <a:ln w="38100">
             <a:solidFill>
-              <a:schemeClr val="tx1">
-                <a:lumMod val="85000"/>
-                <a:lumOff val="15000"/>
-              </a:schemeClr>
+              <a:srgbClr val="FFFF00"/>
             </a:solidFill>
             <a:prstDash val="solid"/>
             <a:tailEnd type="none" w="lg" len="med"/>
@@ -9651,8 +9609,8 @@
         </p:blipFill>
         <p:spPr bwMode="auto">
           <a:xfrm>
-            <a:off x="552587" y="1123950"/>
-            <a:ext cx="5398389" cy="3302962"/>
+            <a:off x="575187" y="895350"/>
+            <a:ext cx="5978013" cy="3657600"/>
           </a:xfrm>
           <a:prstGeom prst="rect">
             <a:avLst/>
@@ -9924,7 +9882,15 @@
             </a:r>
             <a:r>
               <a:rPr lang="en-US" sz="2400" dirty="0" smtClean="0"/>
-              <a:t>to a previous state with the hash values</a:t>
+              <a:t>to a previous state with the </a:t>
+            </a:r>
+            <a:r>
+              <a:rPr lang="en-US" sz="2400" dirty="0" smtClean="0">
+                <a:solidFill>
+                  <a:srgbClr val="FFFF00"/>
+                </a:solidFill>
+              </a:rPr>
+              <a:t>hash values</a:t>
             </a:r>
           </a:p>
           <a:p>
@@ -10878,7 +10844,7 @@
           </a:prstGeom>
           <a:ln w="28575">
             <a:solidFill>
-              <a:schemeClr val="bg1"/>
+              <a:srgbClr val="FFFF00"/>
             </a:solidFill>
             <a:prstDash val="solid"/>
           </a:ln>
@@ -10932,7 +10898,7 @@
             <a:r>
               <a:rPr lang="en-US" sz="2400" dirty="0" smtClean="0">
                 <a:solidFill>
-                  <a:schemeClr val="bg1"/>
+                  <a:srgbClr val="FFFF00"/>
                 </a:solidFill>
                 <a:latin typeface="Bahnschrift Light" panose="020B0502040204020203" pitchFamily="34" charset="0"/>
               </a:rPr>
@@ -11773,8 +11739,8 @@
         </p:blipFill>
         <p:spPr bwMode="auto">
           <a:xfrm>
-            <a:off x="1349968" y="1352550"/>
-            <a:ext cx="6444064" cy="1926644"/>
+            <a:off x="148027" y="1352550"/>
+            <a:ext cx="8920339" cy="2667000"/>
           </a:xfrm>
           <a:prstGeom prst="rect">
             <a:avLst/>
@@ -12336,6 +12302,144 @@
           </a:solidFill>
           <a:ln>
             <a:noFill/>
+          </a:ln>
+        </p:spPr>
+        <p:style>
+          <a:lnRef idx="2">
+            <a:schemeClr val="accent1">
+              <a:shade val="50000"/>
+            </a:schemeClr>
+          </a:lnRef>
+          <a:fillRef idx="1">
+            <a:schemeClr val="accent1"/>
+          </a:fillRef>
+          <a:effectRef idx="0">
+            <a:schemeClr val="accent1"/>
+          </a:effectRef>
+          <a:fontRef idx="minor">
+            <a:schemeClr val="lt1"/>
+          </a:fontRef>
+        </p:style>
+        <p:txBody>
+          <a:bodyPr rtlCol="0" anchor="ctr"/>
+          <a:lstStyle/>
+          <a:p>
+            <a:pPr algn="ctr"/>
+            <a:endParaRPr lang="de-DE"/>
+          </a:p>
+        </p:txBody>
+      </p:sp>
+      <p:sp>
+        <p:nvSpPr>
+          <p:cNvPr id="2" name="Rechteck 1"/>
+          <p:cNvSpPr/>
+          <p:nvPr/>
+        </p:nvSpPr>
+        <p:spPr>
+          <a:xfrm>
+            <a:off x="7391400" y="438150"/>
+            <a:ext cx="762000" cy="381000"/>
+          </a:xfrm>
+          <a:prstGeom prst="rect">
+            <a:avLst/>
+          </a:prstGeom>
+          <a:noFill/>
+          <a:ln>
+            <a:solidFill>
+              <a:srgbClr val="FFFF00"/>
+            </a:solidFill>
+          </a:ln>
+        </p:spPr>
+        <p:style>
+          <a:lnRef idx="2">
+            <a:schemeClr val="accent1">
+              <a:shade val="50000"/>
+            </a:schemeClr>
+          </a:lnRef>
+          <a:fillRef idx="1">
+            <a:schemeClr val="accent1"/>
+          </a:fillRef>
+          <a:effectRef idx="0">
+            <a:schemeClr val="accent1"/>
+          </a:effectRef>
+          <a:fontRef idx="minor">
+            <a:schemeClr val="lt1"/>
+          </a:fontRef>
+        </p:style>
+        <p:txBody>
+          <a:bodyPr rtlCol="0" anchor="ctr"/>
+          <a:lstStyle/>
+          <a:p>
+            <a:pPr algn="ctr"/>
+            <a:endParaRPr lang="de-DE"/>
+          </a:p>
+        </p:txBody>
+      </p:sp>
+      <p:sp>
+        <p:nvSpPr>
+          <p:cNvPr id="6" name="Rechteck 5"/>
+          <p:cNvSpPr/>
+          <p:nvPr/>
+        </p:nvSpPr>
+        <p:spPr>
+          <a:xfrm>
+            <a:off x="7391400" y="971550"/>
+            <a:ext cx="762000" cy="381000"/>
+          </a:xfrm>
+          <a:prstGeom prst="rect">
+            <a:avLst/>
+          </a:prstGeom>
+          <a:noFill/>
+          <a:ln>
+            <a:solidFill>
+              <a:srgbClr val="FFFF00"/>
+            </a:solidFill>
+          </a:ln>
+        </p:spPr>
+        <p:style>
+          <a:lnRef idx="2">
+            <a:schemeClr val="accent1">
+              <a:shade val="50000"/>
+            </a:schemeClr>
+          </a:lnRef>
+          <a:fillRef idx="1">
+            <a:schemeClr val="accent1"/>
+          </a:fillRef>
+          <a:effectRef idx="0">
+            <a:schemeClr val="accent1"/>
+          </a:effectRef>
+          <a:fontRef idx="minor">
+            <a:schemeClr val="lt1"/>
+          </a:fontRef>
+        </p:style>
+        <p:txBody>
+          <a:bodyPr rtlCol="0" anchor="ctr"/>
+          <a:lstStyle/>
+          <a:p>
+            <a:pPr algn="ctr"/>
+            <a:endParaRPr lang="de-DE"/>
+          </a:p>
+        </p:txBody>
+      </p:sp>
+      <p:sp>
+        <p:nvSpPr>
+          <p:cNvPr id="7" name="Rechteck 6"/>
+          <p:cNvSpPr/>
+          <p:nvPr/>
+        </p:nvSpPr>
+        <p:spPr>
+          <a:xfrm>
+            <a:off x="381000" y="1885950"/>
+            <a:ext cx="1905000" cy="304800"/>
+          </a:xfrm>
+          <a:prstGeom prst="rect">
+            <a:avLst/>
+          </a:prstGeom>
+          <a:noFill/>
+          <a:ln>
+            <a:solidFill>
+              <a:srgbClr val="FFFF00"/>
+            </a:solidFill>
           </a:ln>
         </p:spPr>
         <p:style>
@@ -13385,11 +13489,15 @@
                   <a:srgbClr val="81D4FA"/>
                 </a:solidFill>
               </a:rPr>
-              <a:t>changing</a:t>
+              <a:t>switching </a:t>
             </a:r>
             <a:r>
               <a:rPr lang="en-US" sz="2400" dirty="0" smtClean="0"/>
-              <a:t> to it immediately</a:t>
+              <a:t>to </a:t>
+            </a:r>
+            <a:r>
+              <a:rPr lang="en-US" sz="2400" dirty="0" smtClean="0"/>
+              <a:t>it immediately</a:t>
             </a:r>
             <a:endParaRPr lang="de-DE" sz="2400" dirty="0" smtClean="0"/>
           </a:p>
@@ -18595,7 +18703,7 @@
             </a:pPr>
             <a:r>
               <a:rPr lang="en-US" sz="2400" dirty="0" smtClean="0"/>
-              <a:t>Commit on a </a:t>
+              <a:t>Commit </a:t>
             </a:r>
             <a:r>
               <a:rPr lang="en-US" sz="2400" dirty="0" smtClean="0">
@@ -18603,11 +18711,19 @@
                   <a:srgbClr val="81D4FA"/>
                 </a:solidFill>
               </a:rPr>
-              <a:t>regular</a:t>
+              <a:t>regularly</a:t>
+            </a:r>
+            <a:r>
+              <a:rPr lang="en-US" sz="2400" dirty="0"/>
+              <a:t>:</a:t>
             </a:r>
             <a:r>
               <a:rPr lang="en-US" sz="2400" dirty="0" smtClean="0"/>
-              <a:t> basis, avoid 1000 line monolithic commits</a:t>
+              <a:t> </a:t>
+            </a:r>
+            <a:r>
+              <a:rPr lang="en-US" sz="2400" dirty="0" smtClean="0"/>
+              <a:t>avoid 1000 line monolithic commits</a:t>
             </a:r>
           </a:p>
           <a:p>
@@ -18644,7 +18760,15 @@
             </a:r>
             <a:r>
               <a:rPr lang="en-US" sz="2400" dirty="0" smtClean="0"/>
-              <a:t> can influence your </a:t>
+              <a:t> </a:t>
+            </a:r>
+            <a:r>
+              <a:rPr lang="en-US" sz="2400" dirty="0" smtClean="0"/>
+              <a:t>can and will </a:t>
+            </a:r>
+            <a:r>
+              <a:rPr lang="en-US" sz="2400" dirty="0" smtClean="0"/>
+              <a:t>influence your </a:t>
             </a:r>
             <a:r>
               <a:rPr lang="en-US" sz="2400" dirty="0" smtClean="0">
@@ -18677,8 +18801,9 @@
             </a:r>
             <a:r>
               <a:rPr lang="en-US" sz="2400" dirty="0" smtClean="0"/>
-              <a:t>between all team members</a:t>
-            </a:r>
+              <a:t>between all members</a:t>
+            </a:r>
+            <a:endParaRPr lang="en-US" sz="2400" dirty="0" smtClean="0"/>
           </a:p>
           <a:p>
             <a:pPr marL="342900" indent="-342900">
@@ -19049,7 +19174,16 @@
                 </a:solidFill>
                 <a:latin typeface="Consolas" panose="020B0609020204030204" pitchFamily="49" charset="0"/>
               </a:rPr>
-              <a:t>–-recursive</a:t>
+              <a:t>--</a:t>
+            </a:r>
+            <a:r>
+              <a:rPr lang="en-US" dirty="0">
+                <a:solidFill>
+                  <a:srgbClr val="92D050"/>
+                </a:solidFill>
+                <a:latin typeface="Consolas" panose="020B0609020204030204" pitchFamily="49" charset="0"/>
+              </a:rPr>
+              <a:t>recursive</a:t>
             </a:r>
             <a:r>
               <a:rPr lang="en-US" dirty="0" smtClean="0">
@@ -19059,15 +19193,6 @@
                 <a:latin typeface="Consolas" panose="020B0609020204030204" pitchFamily="49" charset="0"/>
               </a:rPr>
               <a:t> </a:t>
-            </a:r>
-            <a:r>
-              <a:rPr lang="en-US" dirty="0" smtClean="0">
-                <a:solidFill>
-                  <a:srgbClr val="FFFF00"/>
-                </a:solidFill>
-                <a:latin typeface="Consolas" panose="020B0609020204030204" pitchFamily="49" charset="0"/>
-              </a:rPr>
-              <a:t>“</a:t>
             </a:r>
             <a:r>
               <a:rPr lang="en-US" dirty="0" smtClean="0">
@@ -19078,71 +19203,7 @@
                 </a:solidFill>
                 <a:latin typeface="Consolas" panose="020B0609020204030204" pitchFamily="49" charset="0"/>
               </a:rPr>
-              <a:t>https://bitbucket.com/SE-</a:t>
-            </a:r>
-            <a:r>
-              <a:rPr lang="en-US" dirty="0" err="1" smtClean="0">
-                <a:solidFill>
-                  <a:schemeClr val="accent5">
-                    <a:lumMod val="75000"/>
-                  </a:schemeClr>
-                </a:solidFill>
-                <a:latin typeface="Consolas" panose="020B0609020204030204" pitchFamily="49" charset="0"/>
-              </a:rPr>
-              <a:t>Robolab</a:t>
-            </a:r>
-            <a:r>
-              <a:rPr lang="en-US" dirty="0" smtClean="0">
-                <a:solidFill>
-                  <a:schemeClr val="accent5">
-                    <a:lumMod val="75000"/>
-                  </a:schemeClr>
-                </a:solidFill>
-                <a:latin typeface="Consolas" panose="020B0609020204030204" pitchFamily="49" charset="0"/>
-              </a:rPr>
-              <a:t>/</a:t>
-            </a:r>
-            <a:r>
-              <a:rPr lang="en-US" dirty="0" err="1" smtClean="0">
-                <a:solidFill>
-                  <a:schemeClr val="accent5">
-                    <a:lumMod val="75000"/>
-                  </a:schemeClr>
-                </a:solidFill>
-                <a:latin typeface="Consolas" panose="020B0609020204030204" pitchFamily="49" charset="0"/>
-              </a:rPr>
-              <a:t>robolab</a:t>
-            </a:r>
-            <a:r>
-              <a:rPr lang="en-US" dirty="0" smtClean="0">
-                <a:solidFill>
-                  <a:schemeClr val="accent5">
-                    <a:lumMod val="75000"/>
-                  </a:schemeClr>
-                </a:solidFill>
-                <a:latin typeface="Consolas" panose="020B0609020204030204" pitchFamily="49" charset="0"/>
-              </a:rPr>
-              <a:t>-template-</a:t>
-            </a:r>
-            <a:r>
-              <a:rPr lang="en-US" dirty="0" err="1" smtClean="0">
-                <a:solidFill>
-                  <a:schemeClr val="accent5">
-                    <a:lumMod val="75000"/>
-                  </a:schemeClr>
-                </a:solidFill>
-                <a:latin typeface="Consolas" panose="020B0609020204030204" pitchFamily="49" charset="0"/>
-              </a:rPr>
-              <a:t>lab.git</a:t>
-            </a:r>
-            <a:r>
-              <a:rPr lang="en-US" dirty="0" smtClean="0">
-                <a:solidFill>
-                  <a:srgbClr val="FFFF00"/>
-                </a:solidFill>
-                <a:latin typeface="Consolas" panose="020B0609020204030204" pitchFamily="49" charset="0"/>
-              </a:rPr>
-              <a:t>”</a:t>
+              <a:t>https://bitbucket.com/SE-Robolab/robolab-template-lab.git</a:t>
             </a:r>
             <a:endParaRPr lang="de-DE" dirty="0">
               <a:solidFill>
@@ -19466,25 +19527,16 @@
             <a:r>
               <a:rPr lang="en-US" sz="1600" dirty="0" smtClean="0">
                 <a:solidFill>
-                  <a:srgbClr val="FFFF00"/>
-                </a:solidFill>
-                <a:latin typeface="Consolas" panose="020B0609020204030204" pitchFamily="49" charset="0"/>
-              </a:rPr>
-              <a:t>“</a:t>
-            </a:r>
-            <a:r>
-              <a:rPr lang="en-US" sz="1600" dirty="0">
-                <a:solidFill>
                   <a:schemeClr val="accent5">
                     <a:lumMod val="75000"/>
                   </a:schemeClr>
                 </a:solidFill>
                 <a:latin typeface="Consolas" panose="020B0609020204030204" pitchFamily="49" charset="0"/>
               </a:rPr>
-              <a:t>https://</a:t>
-            </a:r>
-            <a:r>
-              <a:rPr lang="en-US" sz="1600" dirty="0" smtClean="0">
+              <a:t>https</a:t>
+            </a:r>
+            <a:r>
+              <a:rPr lang="en-US" sz="1600" dirty="0">
                 <a:solidFill>
                   <a:schemeClr val="accent5">
                     <a:lumMod val="75000"/>
@@ -19492,10 +19544,10 @@
                 </a:solidFill>
                 <a:latin typeface="Consolas" panose="020B0609020204030204" pitchFamily="49" charset="0"/>
               </a:rPr>
-              <a:t>bitbucket.org/robolab-autumn-18/group-</a:t>
-            </a:r>
-            <a:r>
-              <a:rPr lang="en-US" sz="1600" dirty="0">
+              <a:t>://</a:t>
+            </a:r>
+            <a:r>
+              <a:rPr lang="en-US" sz="1600" dirty="0" smtClean="0">
                 <a:solidFill>
                   <a:schemeClr val="accent5">
                     <a:lumMod val="75000"/>
@@ -19503,16 +19555,29 @@
                 </a:solidFill>
                 <a:latin typeface="Consolas" panose="020B0609020204030204" pitchFamily="49" charset="0"/>
               </a:rPr>
-              <a:t>&lt;id&gt;</a:t>
+              <a:t>bitbucket.org/robolab-autumn-18/group-</a:t>
+            </a:r>
+            <a:r>
+              <a:rPr lang="en-US" sz="1600" dirty="0">
+                <a:solidFill>
+                  <a:schemeClr val="accent5">
+                    <a:lumMod val="75000"/>
+                  </a:schemeClr>
+                </a:solidFill>
+                <a:latin typeface="Consolas" panose="020B0609020204030204" pitchFamily="49" charset="0"/>
+              </a:rPr>
+              <a:t>&lt;id</a:t>
             </a:r>
             <a:r>
               <a:rPr lang="en-US" sz="1600" dirty="0" smtClean="0">
                 <a:solidFill>
-                  <a:srgbClr val="FFFF00"/>
+                  <a:schemeClr val="accent5">
+                    <a:lumMod val="75000"/>
+                  </a:schemeClr>
                 </a:solidFill>
                 <a:latin typeface="Consolas" panose="020B0609020204030204" pitchFamily="49" charset="0"/>
               </a:rPr>
-              <a:t>”</a:t>
+              <a:t>&gt;</a:t>
             </a:r>
             <a:endParaRPr lang="de-DE" sz="1600" dirty="0">
               <a:solidFill>
@@ -19900,16 +19965,7 @@
               <a:t>clone </a:t>
             </a:r>
             <a:r>
-              <a:rPr lang="en-US" dirty="0">
-                <a:solidFill>
-                  <a:srgbClr val="FFFF00"/>
-                </a:solidFill>
-                <a:latin typeface="Consolas" panose="020B0609020204030204" pitchFamily="49" charset="0"/>
-              </a:rPr>
-              <a:t>“</a:t>
-            </a:r>
-            <a:r>
-              <a:rPr lang="en-US" dirty="0">
+              <a:rPr lang="en-US" dirty="0" smtClean="0">
                 <a:solidFill>
                   <a:schemeClr val="accent5">
                     <a:lumMod val="75000"/>
@@ -19917,10 +19973,10 @@
                 </a:solidFill>
                 <a:latin typeface="Consolas" panose="020B0609020204030204" pitchFamily="49" charset="0"/>
               </a:rPr>
-              <a:t>https://</a:t>
-            </a:r>
-            <a:r>
-              <a:rPr lang="en-US" dirty="0" smtClean="0">
+              <a:t>https</a:t>
+            </a:r>
+            <a:r>
+              <a:rPr lang="en-US" dirty="0">
                 <a:solidFill>
                   <a:schemeClr val="accent5">
                     <a:lumMod val="75000"/>
@@ -19928,10 +19984,10 @@
                 </a:solidFill>
                 <a:latin typeface="Consolas" panose="020B0609020204030204" pitchFamily="49" charset="0"/>
               </a:rPr>
-              <a:t>bitbucket.org/robolab-autumn-18/group-</a:t>
-            </a:r>
-            <a:r>
-              <a:rPr lang="en-US" dirty="0">
+              <a:t>://</a:t>
+            </a:r>
+            <a:r>
+              <a:rPr lang="en-US" dirty="0" smtClean="0">
                 <a:solidFill>
                   <a:schemeClr val="accent5">
                     <a:lumMod val="75000"/>
@@ -19939,16 +19995,29 @@
                 </a:solidFill>
                 <a:latin typeface="Consolas" panose="020B0609020204030204" pitchFamily="49" charset="0"/>
               </a:rPr>
-              <a:t>&lt;id&gt;</a:t>
+              <a:t>bitbucket.org/robolab-autumn-18/group-</a:t>
             </a:r>
             <a:r>
               <a:rPr lang="en-US" dirty="0">
                 <a:solidFill>
-                  <a:srgbClr val="FFFF00"/>
+                  <a:schemeClr val="accent5">
+                    <a:lumMod val="75000"/>
+                  </a:schemeClr>
                 </a:solidFill>
                 <a:latin typeface="Consolas" panose="020B0609020204030204" pitchFamily="49" charset="0"/>
               </a:rPr>
-              <a:t>”</a:t>
+              <a:t>&lt;id</a:t>
+            </a:r>
+            <a:r>
+              <a:rPr lang="en-US" dirty="0" smtClean="0">
+                <a:solidFill>
+                  <a:schemeClr val="accent5">
+                    <a:lumMod val="75000"/>
+                  </a:schemeClr>
+                </a:solidFill>
+                <a:latin typeface="Consolas" panose="020B0609020204030204" pitchFamily="49" charset="0"/>
+              </a:rPr>
+              <a:t>&gt;</a:t>
             </a:r>
             <a:endParaRPr lang="de-DE" dirty="0">
               <a:solidFill>
@@ -20168,7 +20237,11 @@
             </a:pPr>
             <a:r>
               <a:rPr lang="en-US" sz="2400" dirty="0" smtClean="0"/>
-              <a:t>Versioning?</a:t>
+              <a:t>Versioning</a:t>
+            </a:r>
+            <a:r>
+              <a:rPr lang="en-US" sz="2400" dirty="0" smtClean="0"/>
+              <a:t>?</a:t>
             </a:r>
           </a:p>
           <a:p>
@@ -20180,8 +20253,16 @@
               <a:buChar char="•"/>
             </a:pPr>
             <a:r>
-              <a:rPr lang="en-US" sz="2400" dirty="0" smtClean="0"/>
-              <a:t>Recover from </a:t>
+              <a:rPr lang="en-US" sz="2400" dirty="0"/>
+              <a:t>What is the current </a:t>
+            </a:r>
+            <a:r>
+              <a:rPr lang="en-US" sz="2400" dirty="0">
+                <a:solidFill>
+                  <a:srgbClr val="81D4FA"/>
+                </a:solidFill>
+              </a:rPr>
+              <a:t>common </a:t>
             </a:r>
             <a:r>
               <a:rPr lang="en-US" sz="2400" dirty="0" smtClean="0">
@@ -20189,44 +20270,13 @@
                   <a:srgbClr val="81D4FA"/>
                 </a:solidFill>
               </a:rPr>
-              <a:t>chaos</a:t>
-            </a:r>
-            <a:r>
-              <a:rPr lang="en-US" sz="2400" dirty="0" smtClean="0"/>
-              <a:t>, </a:t>
-            </a:r>
-            <a:r>
-              <a:rPr lang="en-US" sz="2400" dirty="0" smtClean="0">
-                <a:solidFill>
-                  <a:srgbClr val="81D4FA"/>
-                </a:solidFill>
-              </a:rPr>
-              <a:t>hate</a:t>
-            </a:r>
-            <a:r>
-              <a:rPr lang="en-US" sz="2400" dirty="0" smtClean="0"/>
-              <a:t> </a:t>
-            </a:r>
-            <a:r>
-              <a:rPr lang="en-US" sz="2400" dirty="0"/>
-              <a:t>a</a:t>
-            </a:r>
-            <a:r>
-              <a:rPr lang="en-US" sz="2400" dirty="0" smtClean="0"/>
-              <a:t>nd </a:t>
-            </a:r>
-            <a:r>
-              <a:rPr lang="en-US" sz="2400" dirty="0" smtClean="0">
-                <a:solidFill>
-                  <a:srgbClr val="81D4FA"/>
-                </a:solidFill>
-              </a:rPr>
-              <a:t>despair</a:t>
+              <a:t>ground</a:t>
             </a:r>
             <a:r>
               <a:rPr lang="en-US" sz="2400" dirty="0" smtClean="0"/>
               <a:t>?</a:t>
             </a:r>
+            <a:endParaRPr lang="en-US" sz="2400" dirty="0" smtClean="0"/>
           </a:p>
           <a:p>
             <a:pPr marL="457200" indent="-457200">
@@ -20242,7 +20292,23 @@
                   <a:srgbClr val="FFFF00"/>
                 </a:solidFill>
               </a:rPr>
-              <a:t>What is the current common work base?</a:t>
+              <a:t>Recover from chaos, hate </a:t>
+            </a:r>
+            <a:r>
+              <a:rPr lang="en-US" sz="2400" dirty="0">
+                <a:solidFill>
+                  <a:srgbClr val="FFFF00"/>
+                </a:solidFill>
+              </a:rPr>
+              <a:t>a</a:t>
+            </a:r>
+            <a:r>
+              <a:rPr lang="en-US" sz="2400" dirty="0" smtClean="0">
+                <a:solidFill>
+                  <a:srgbClr val="FFFF00"/>
+                </a:solidFill>
+              </a:rPr>
+              <a:t>nd despair?</a:t>
             </a:r>
           </a:p>
           <a:p>
@@ -20481,8 +20547,9 @@
             </a:r>
             <a:r>
               <a:rPr lang="en-US" sz="2400" dirty="0" smtClean="0"/>
-              <a:t>!</a:t>
-            </a:r>
+              <a:t>! Communication is key!</a:t>
+            </a:r>
+            <a:endParaRPr lang="en-US" sz="2400" dirty="0" smtClean="0"/>
           </a:p>
           <a:p>
             <a:pPr>

</xml_diff>